<commit_message>
#7 add controls: SIZE, MTB, LEV; variable creation and data screening
</commit_message>
<xml_diff>
--- a/output/figure_1.pptx
+++ b/output/figure_1.pptx
@@ -261,7 +261,7 @@
           <a:p>
             <a:fld id="{F6465CF2-20FA-4A27-B5DD-24B9293428AE}" type="datetimeFigureOut">
               <a:rPr lang="en-US" smtClean="0"/>
-              <a:t>4/8/2020</a:t>
+              <a:t>4/10/2020</a:t>
             </a:fld>
             <a:endParaRPr lang="en-US"/>
           </a:p>
@@ -459,7 +459,7 @@
           <a:p>
             <a:fld id="{F6465CF2-20FA-4A27-B5DD-24B9293428AE}" type="datetimeFigureOut">
               <a:rPr lang="en-US" smtClean="0"/>
-              <a:t>4/8/2020</a:t>
+              <a:t>4/10/2020</a:t>
             </a:fld>
             <a:endParaRPr lang="en-US"/>
           </a:p>
@@ -667,7 +667,7 @@
           <a:p>
             <a:fld id="{F6465CF2-20FA-4A27-B5DD-24B9293428AE}" type="datetimeFigureOut">
               <a:rPr lang="en-US" smtClean="0"/>
-              <a:t>4/8/2020</a:t>
+              <a:t>4/10/2020</a:t>
             </a:fld>
             <a:endParaRPr lang="en-US"/>
           </a:p>
@@ -865,7 +865,7 @@
           <a:p>
             <a:fld id="{F6465CF2-20FA-4A27-B5DD-24B9293428AE}" type="datetimeFigureOut">
               <a:rPr lang="en-US" smtClean="0"/>
-              <a:t>4/8/2020</a:t>
+              <a:t>4/10/2020</a:t>
             </a:fld>
             <a:endParaRPr lang="en-US"/>
           </a:p>
@@ -1140,7 +1140,7 @@
           <a:p>
             <a:fld id="{F6465CF2-20FA-4A27-B5DD-24B9293428AE}" type="datetimeFigureOut">
               <a:rPr lang="en-US" smtClean="0"/>
-              <a:t>4/8/2020</a:t>
+              <a:t>4/10/2020</a:t>
             </a:fld>
             <a:endParaRPr lang="en-US"/>
           </a:p>
@@ -1405,7 +1405,7 @@
           <a:p>
             <a:fld id="{F6465CF2-20FA-4A27-B5DD-24B9293428AE}" type="datetimeFigureOut">
               <a:rPr lang="en-US" smtClean="0"/>
-              <a:t>4/8/2020</a:t>
+              <a:t>4/10/2020</a:t>
             </a:fld>
             <a:endParaRPr lang="en-US"/>
           </a:p>
@@ -1817,7 +1817,7 @@
           <a:p>
             <a:fld id="{F6465CF2-20FA-4A27-B5DD-24B9293428AE}" type="datetimeFigureOut">
               <a:rPr lang="en-US" smtClean="0"/>
-              <a:t>4/8/2020</a:t>
+              <a:t>4/10/2020</a:t>
             </a:fld>
             <a:endParaRPr lang="en-US"/>
           </a:p>
@@ -1958,7 +1958,7 @@
           <a:p>
             <a:fld id="{F6465CF2-20FA-4A27-B5DD-24B9293428AE}" type="datetimeFigureOut">
               <a:rPr lang="en-US" smtClean="0"/>
-              <a:t>4/8/2020</a:t>
+              <a:t>4/10/2020</a:t>
             </a:fld>
             <a:endParaRPr lang="en-US"/>
           </a:p>
@@ -2071,7 +2071,7 @@
           <a:p>
             <a:fld id="{F6465CF2-20FA-4A27-B5DD-24B9293428AE}" type="datetimeFigureOut">
               <a:rPr lang="en-US" smtClean="0"/>
-              <a:t>4/8/2020</a:t>
+              <a:t>4/10/2020</a:t>
             </a:fld>
             <a:endParaRPr lang="en-US"/>
           </a:p>
@@ -2382,7 +2382,7 @@
           <a:p>
             <a:fld id="{F6465CF2-20FA-4A27-B5DD-24B9293428AE}" type="datetimeFigureOut">
               <a:rPr lang="en-US" smtClean="0"/>
-              <a:t>4/8/2020</a:t>
+              <a:t>4/10/2020</a:t>
             </a:fld>
             <a:endParaRPr lang="en-US"/>
           </a:p>
@@ -2670,7 +2670,7 @@
           <a:p>
             <a:fld id="{F6465CF2-20FA-4A27-B5DD-24B9293428AE}" type="datetimeFigureOut">
               <a:rPr lang="en-US" smtClean="0"/>
-              <a:t>4/8/2020</a:t>
+              <a:t>4/10/2020</a:t>
             </a:fld>
             <a:endParaRPr lang="en-US"/>
           </a:p>
@@ -2911,7 +2911,7 @@
           <a:p>
             <a:fld id="{F6465CF2-20FA-4A27-B5DD-24B9293428AE}" type="datetimeFigureOut">
               <a:rPr lang="en-US" smtClean="0"/>
-              <a:t>4/8/2020</a:t>
+              <a:t>4/10/2020</a:t>
             </a:fld>
             <a:endParaRPr lang="en-US"/>
           </a:p>
@@ -9704,7 +9704,7 @@
         <p:spPr>
           <a:xfrm>
             <a:off x="4940219" y="5201498"/>
-            <a:ext cx="5224709" cy="1429217"/>
+            <a:ext cx="6112478" cy="1429217"/>
           </a:xfrm>
           <a:prstGeom prst="rect">
             <a:avLst/>
@@ -9927,7 +9927,7 @@
             </a:pPr>
             <a:r>
               <a:rPr lang="en-US" sz="1400" dirty="0"/>
-              <a:t>dropping obs. with total number of 10-Q words less than 1% threshold of the merged sample (1185 words): </a:t>
+              <a:t>dropping obs. according to a set of data screening criterion*: </a:t>
             </a:r>
             <a:r>
               <a:rPr lang="en-US" sz="1400" dirty="0">
@@ -9935,7 +9935,7 @@
                   <a:srgbClr val="FF0000"/>
                 </a:highlight>
               </a:rPr>
-              <a:t>300,806</a:t>
+              <a:t>253,295</a:t>
             </a:r>
           </a:p>
           <a:p>
@@ -10351,6 +10351,210 @@
                 </a:highlight>
               </a:rPr>
               <a:t>CRSP_COMP_10-Q Merging Process</a:t>
+            </a:r>
+          </a:p>
+        </p:txBody>
+      </p:sp>
+      <p:sp>
+        <p:nvSpPr>
+          <p:cNvPr id="24" name="Subtitle 2">
+            <a:extLst>
+              <a:ext uri="{FF2B5EF4-FFF2-40B4-BE49-F238E27FC236}">
+                <a16:creationId xmlns:a16="http://schemas.microsoft.com/office/drawing/2014/main" id="{C6CCC906-F6B6-45CD-A3C9-E4809C018234}"/>
+              </a:ext>
+            </a:extLst>
+          </p:cNvPr>
+          <p:cNvSpPr txBox="1">
+            <a:spLocks/>
+          </p:cNvSpPr>
+          <p:nvPr/>
+        </p:nvSpPr>
+        <p:spPr>
+          <a:xfrm>
+            <a:off x="3963880" y="6487946"/>
+            <a:ext cx="8294331" cy="301374"/>
+          </a:xfrm>
+          <a:prstGeom prst="rect">
+            <a:avLst/>
+          </a:prstGeom>
+        </p:spPr>
+        <p:txBody>
+          <a:bodyPr vert="horz" lIns="91440" tIns="45720" rIns="91440" bIns="45720" rtlCol="0">
+            <a:normAutofit/>
+          </a:bodyPr>
+          <a:lstStyle>
+            <a:lvl1pPr marL="0" indent="0" algn="ctr" defTabSz="914400" rtl="0" eaLnBrk="1" latinLnBrk="0" hangingPunct="1">
+              <a:lnSpc>
+                <a:spcPct val="90000"/>
+              </a:lnSpc>
+              <a:spcBef>
+                <a:spcPts val="1000"/>
+              </a:spcBef>
+              <a:buFont typeface="Arial" panose="020B0604020202020204" pitchFamily="34" charset="0"/>
+              <a:buNone/>
+              <a:defRPr sz="2400" kern="1200">
+                <a:solidFill>
+                  <a:schemeClr val="tx1"/>
+                </a:solidFill>
+                <a:latin typeface="+mn-lt"/>
+                <a:ea typeface="+mn-ea"/>
+                <a:cs typeface="+mn-cs"/>
+              </a:defRPr>
+            </a:lvl1pPr>
+            <a:lvl2pPr marL="457200" indent="0" algn="ctr" defTabSz="914400" rtl="0" eaLnBrk="1" latinLnBrk="0" hangingPunct="1">
+              <a:lnSpc>
+                <a:spcPct val="90000"/>
+              </a:lnSpc>
+              <a:spcBef>
+                <a:spcPts val="500"/>
+              </a:spcBef>
+              <a:buFont typeface="Arial" panose="020B0604020202020204" pitchFamily="34" charset="0"/>
+              <a:buNone/>
+              <a:defRPr sz="2000" kern="1200">
+                <a:solidFill>
+                  <a:schemeClr val="tx1"/>
+                </a:solidFill>
+                <a:latin typeface="+mn-lt"/>
+                <a:ea typeface="+mn-ea"/>
+                <a:cs typeface="+mn-cs"/>
+              </a:defRPr>
+            </a:lvl2pPr>
+            <a:lvl3pPr marL="914400" indent="0" algn="ctr" defTabSz="914400" rtl="0" eaLnBrk="1" latinLnBrk="0" hangingPunct="1">
+              <a:lnSpc>
+                <a:spcPct val="90000"/>
+              </a:lnSpc>
+              <a:spcBef>
+                <a:spcPts val="500"/>
+              </a:spcBef>
+              <a:buFont typeface="Arial" panose="020B0604020202020204" pitchFamily="34" charset="0"/>
+              <a:buNone/>
+              <a:defRPr sz="1800" kern="1200">
+                <a:solidFill>
+                  <a:schemeClr val="tx1"/>
+                </a:solidFill>
+                <a:latin typeface="+mn-lt"/>
+                <a:ea typeface="+mn-ea"/>
+                <a:cs typeface="+mn-cs"/>
+              </a:defRPr>
+            </a:lvl3pPr>
+            <a:lvl4pPr marL="1371600" indent="0" algn="ctr" defTabSz="914400" rtl="0" eaLnBrk="1" latinLnBrk="0" hangingPunct="1">
+              <a:lnSpc>
+                <a:spcPct val="90000"/>
+              </a:lnSpc>
+              <a:spcBef>
+                <a:spcPts val="500"/>
+              </a:spcBef>
+              <a:buFont typeface="Arial" panose="020B0604020202020204" pitchFamily="34" charset="0"/>
+              <a:buNone/>
+              <a:defRPr sz="1600" kern="1200">
+                <a:solidFill>
+                  <a:schemeClr val="tx1"/>
+                </a:solidFill>
+                <a:latin typeface="+mn-lt"/>
+                <a:ea typeface="+mn-ea"/>
+                <a:cs typeface="+mn-cs"/>
+              </a:defRPr>
+            </a:lvl4pPr>
+            <a:lvl5pPr marL="1828800" indent="0" algn="ctr" defTabSz="914400" rtl="0" eaLnBrk="1" latinLnBrk="0" hangingPunct="1">
+              <a:lnSpc>
+                <a:spcPct val="90000"/>
+              </a:lnSpc>
+              <a:spcBef>
+                <a:spcPts val="500"/>
+              </a:spcBef>
+              <a:buFont typeface="Arial" panose="020B0604020202020204" pitchFamily="34" charset="0"/>
+              <a:buNone/>
+              <a:defRPr sz="1600" kern="1200">
+                <a:solidFill>
+                  <a:schemeClr val="tx1"/>
+                </a:solidFill>
+                <a:latin typeface="+mn-lt"/>
+                <a:ea typeface="+mn-ea"/>
+                <a:cs typeface="+mn-cs"/>
+              </a:defRPr>
+            </a:lvl5pPr>
+            <a:lvl6pPr marL="2286000" indent="0" algn="ctr" defTabSz="914400" rtl="0" eaLnBrk="1" latinLnBrk="0" hangingPunct="1">
+              <a:lnSpc>
+                <a:spcPct val="90000"/>
+              </a:lnSpc>
+              <a:spcBef>
+                <a:spcPts val="500"/>
+              </a:spcBef>
+              <a:buFont typeface="Arial" panose="020B0604020202020204" pitchFamily="34" charset="0"/>
+              <a:buNone/>
+              <a:defRPr sz="1600" kern="1200">
+                <a:solidFill>
+                  <a:schemeClr val="tx1"/>
+                </a:solidFill>
+                <a:latin typeface="+mn-lt"/>
+                <a:ea typeface="+mn-ea"/>
+                <a:cs typeface="+mn-cs"/>
+              </a:defRPr>
+            </a:lvl6pPr>
+            <a:lvl7pPr marL="2743200" indent="0" algn="ctr" defTabSz="914400" rtl="0" eaLnBrk="1" latinLnBrk="0" hangingPunct="1">
+              <a:lnSpc>
+                <a:spcPct val="90000"/>
+              </a:lnSpc>
+              <a:spcBef>
+                <a:spcPts val="500"/>
+              </a:spcBef>
+              <a:buFont typeface="Arial" panose="020B0604020202020204" pitchFamily="34" charset="0"/>
+              <a:buNone/>
+              <a:defRPr sz="1600" kern="1200">
+                <a:solidFill>
+                  <a:schemeClr val="tx1"/>
+                </a:solidFill>
+                <a:latin typeface="+mn-lt"/>
+                <a:ea typeface="+mn-ea"/>
+                <a:cs typeface="+mn-cs"/>
+              </a:defRPr>
+            </a:lvl7pPr>
+            <a:lvl8pPr marL="3200400" indent="0" algn="ctr" defTabSz="914400" rtl="0" eaLnBrk="1" latinLnBrk="0" hangingPunct="1">
+              <a:lnSpc>
+                <a:spcPct val="90000"/>
+              </a:lnSpc>
+              <a:spcBef>
+                <a:spcPts val="500"/>
+              </a:spcBef>
+              <a:buFont typeface="Arial" panose="020B0604020202020204" pitchFamily="34" charset="0"/>
+              <a:buNone/>
+              <a:defRPr sz="1600" kern="1200">
+                <a:solidFill>
+                  <a:schemeClr val="tx1"/>
+                </a:solidFill>
+                <a:latin typeface="+mn-lt"/>
+                <a:ea typeface="+mn-ea"/>
+                <a:cs typeface="+mn-cs"/>
+              </a:defRPr>
+            </a:lvl8pPr>
+            <a:lvl9pPr marL="3657600" indent="0" algn="ctr" defTabSz="914400" rtl="0" eaLnBrk="1" latinLnBrk="0" hangingPunct="1">
+              <a:lnSpc>
+                <a:spcPct val="90000"/>
+              </a:lnSpc>
+              <a:spcBef>
+                <a:spcPts val="500"/>
+              </a:spcBef>
+              <a:buFont typeface="Arial" panose="020B0604020202020204" pitchFamily="34" charset="0"/>
+              <a:buNone/>
+              <a:defRPr sz="1600" kern="1200">
+                <a:solidFill>
+                  <a:schemeClr val="tx1"/>
+                </a:solidFill>
+                <a:latin typeface="+mn-lt"/>
+                <a:ea typeface="+mn-ea"/>
+                <a:cs typeface="+mn-cs"/>
+              </a:defRPr>
+            </a:lvl9pPr>
+          </a:lstStyle>
+          <a:p>
+            <a:pPr algn="l"/>
+            <a:r>
+              <a:rPr lang="en-US" sz="1400" dirty="0">
+                <a:highlight>
+                  <a:srgbClr val="C0C0C0"/>
+                </a:highlight>
+              </a:rPr>
+              <a:t>* For example, dropping non-positive total asset/book equity, 10-Q words less than 1% quantile etc., see code.</a:t>
             </a:r>
           </a:p>
         </p:txBody>

</xml_diff>

<commit_message>
modify TLAG def; 8-K data merge WIP
</commit_message>
<xml_diff>
--- a/output/figure_1.pptx
+++ b/output/figure_1.pptx
@@ -9927,16 +9927,25 @@
             </a:pPr>
             <a:r>
               <a:rPr lang="en-US" sz="1400" dirty="0"/>
-              <a:t>dropping obs. according to a set of data screening criterion*: </a:t>
-            </a:r>
-            <a:r>
-              <a:rPr lang="en-US" sz="1400" dirty="0">
+              <a:t>dropping obs. according to a set of data screening criterion</a:t>
+            </a:r>
+            <a:r>
+              <a:rPr lang="en-US" sz="1400"/>
+              <a:t>*: </a:t>
+            </a:r>
+            <a:r>
+              <a:rPr lang="en-US" sz="1400">
                 <a:highlight>
                   <a:srgbClr val="FF0000"/>
                 </a:highlight>
               </a:rPr>
-              <a:t>253,295</a:t>
-            </a:r>
+              <a:t>189,501</a:t>
+            </a:r>
+            <a:endParaRPr lang="en-US" sz="1400" dirty="0">
+              <a:highlight>
+                <a:srgbClr val="FF0000"/>
+              </a:highlight>
+            </a:endParaRPr>
           </a:p>
           <a:p>
             <a:pPr marL="742950" lvl="1" indent="-285750" algn="l">

</xml_diff>

<commit_message>
produced main results for 10-Q
</commit_message>
<xml_diff>
--- a/output/figure_1.pptx
+++ b/output/figure_1.pptx
@@ -261,7 +261,7 @@
           <a:p>
             <a:fld id="{F6465CF2-20FA-4A27-B5DD-24B9293428AE}" type="datetimeFigureOut">
               <a:rPr lang="en-US" smtClean="0"/>
-              <a:t>4/10/2020</a:t>
+              <a:t>4/11/2020</a:t>
             </a:fld>
             <a:endParaRPr lang="en-US"/>
           </a:p>
@@ -459,7 +459,7 @@
           <a:p>
             <a:fld id="{F6465CF2-20FA-4A27-B5DD-24B9293428AE}" type="datetimeFigureOut">
               <a:rPr lang="en-US" smtClean="0"/>
-              <a:t>4/10/2020</a:t>
+              <a:t>4/11/2020</a:t>
             </a:fld>
             <a:endParaRPr lang="en-US"/>
           </a:p>
@@ -667,7 +667,7 @@
           <a:p>
             <a:fld id="{F6465CF2-20FA-4A27-B5DD-24B9293428AE}" type="datetimeFigureOut">
               <a:rPr lang="en-US" smtClean="0"/>
-              <a:t>4/10/2020</a:t>
+              <a:t>4/11/2020</a:t>
             </a:fld>
             <a:endParaRPr lang="en-US"/>
           </a:p>
@@ -865,7 +865,7 @@
           <a:p>
             <a:fld id="{F6465CF2-20FA-4A27-B5DD-24B9293428AE}" type="datetimeFigureOut">
               <a:rPr lang="en-US" smtClean="0"/>
-              <a:t>4/10/2020</a:t>
+              <a:t>4/11/2020</a:t>
             </a:fld>
             <a:endParaRPr lang="en-US"/>
           </a:p>
@@ -1140,7 +1140,7 @@
           <a:p>
             <a:fld id="{F6465CF2-20FA-4A27-B5DD-24B9293428AE}" type="datetimeFigureOut">
               <a:rPr lang="en-US" smtClean="0"/>
-              <a:t>4/10/2020</a:t>
+              <a:t>4/11/2020</a:t>
             </a:fld>
             <a:endParaRPr lang="en-US"/>
           </a:p>
@@ -1405,7 +1405,7 @@
           <a:p>
             <a:fld id="{F6465CF2-20FA-4A27-B5DD-24B9293428AE}" type="datetimeFigureOut">
               <a:rPr lang="en-US" smtClean="0"/>
-              <a:t>4/10/2020</a:t>
+              <a:t>4/11/2020</a:t>
             </a:fld>
             <a:endParaRPr lang="en-US"/>
           </a:p>
@@ -1817,7 +1817,7 @@
           <a:p>
             <a:fld id="{F6465CF2-20FA-4A27-B5DD-24B9293428AE}" type="datetimeFigureOut">
               <a:rPr lang="en-US" smtClean="0"/>
-              <a:t>4/10/2020</a:t>
+              <a:t>4/11/2020</a:t>
             </a:fld>
             <a:endParaRPr lang="en-US"/>
           </a:p>
@@ -1958,7 +1958,7 @@
           <a:p>
             <a:fld id="{F6465CF2-20FA-4A27-B5DD-24B9293428AE}" type="datetimeFigureOut">
               <a:rPr lang="en-US" smtClean="0"/>
-              <a:t>4/10/2020</a:t>
+              <a:t>4/11/2020</a:t>
             </a:fld>
             <a:endParaRPr lang="en-US"/>
           </a:p>
@@ -2071,7 +2071,7 @@
           <a:p>
             <a:fld id="{F6465CF2-20FA-4A27-B5DD-24B9293428AE}" type="datetimeFigureOut">
               <a:rPr lang="en-US" smtClean="0"/>
-              <a:t>4/10/2020</a:t>
+              <a:t>4/11/2020</a:t>
             </a:fld>
             <a:endParaRPr lang="en-US"/>
           </a:p>
@@ -2382,7 +2382,7 @@
           <a:p>
             <a:fld id="{F6465CF2-20FA-4A27-B5DD-24B9293428AE}" type="datetimeFigureOut">
               <a:rPr lang="en-US" smtClean="0"/>
-              <a:t>4/10/2020</a:t>
+              <a:t>4/11/2020</a:t>
             </a:fld>
             <a:endParaRPr lang="en-US"/>
           </a:p>
@@ -2670,7 +2670,7 @@
           <a:p>
             <a:fld id="{F6465CF2-20FA-4A27-B5DD-24B9293428AE}" type="datetimeFigureOut">
               <a:rPr lang="en-US" smtClean="0"/>
-              <a:t>4/10/2020</a:t>
+              <a:t>4/11/2020</a:t>
             </a:fld>
             <a:endParaRPr lang="en-US"/>
           </a:p>
@@ -2911,7 +2911,7 @@
           <a:p>
             <a:fld id="{F6465CF2-20FA-4A27-B5DD-24B9293428AE}" type="datetimeFigureOut">
               <a:rPr lang="en-US" smtClean="0"/>
-              <a:t>4/10/2020</a:t>
+              <a:t>4/11/2020</a:t>
             </a:fld>
             <a:endParaRPr lang="en-US"/>
           </a:p>
@@ -9939,7 +9939,7 @@
                   <a:srgbClr val="FF0000"/>
                 </a:highlight>
               </a:rPr>
-              <a:t>189,501</a:t>
+              <a:t>190,926</a:t>
             </a:r>
             <a:endParaRPr lang="en-US" sz="1400" dirty="0">
               <a:highlight>

</xml_diff>

<commit_message>
create T1PB: correlation matrix and T2: results_10-Q
</commit_message>
<xml_diff>
--- a/output/figure_1.pptx
+++ b/output/figure_1.pptx
@@ -261,7 +261,7 @@
           <a:p>
             <a:fld id="{F6465CF2-20FA-4A27-B5DD-24B9293428AE}" type="datetimeFigureOut">
               <a:rPr lang="en-US" smtClean="0"/>
-              <a:t>4/11/2020</a:t>
+              <a:t>4/12/2020</a:t>
             </a:fld>
             <a:endParaRPr lang="en-US"/>
           </a:p>
@@ -459,7 +459,7 @@
           <a:p>
             <a:fld id="{F6465CF2-20FA-4A27-B5DD-24B9293428AE}" type="datetimeFigureOut">
               <a:rPr lang="en-US" smtClean="0"/>
-              <a:t>4/11/2020</a:t>
+              <a:t>4/12/2020</a:t>
             </a:fld>
             <a:endParaRPr lang="en-US"/>
           </a:p>
@@ -667,7 +667,7 @@
           <a:p>
             <a:fld id="{F6465CF2-20FA-4A27-B5DD-24B9293428AE}" type="datetimeFigureOut">
               <a:rPr lang="en-US" smtClean="0"/>
-              <a:t>4/11/2020</a:t>
+              <a:t>4/12/2020</a:t>
             </a:fld>
             <a:endParaRPr lang="en-US"/>
           </a:p>
@@ -865,7 +865,7 @@
           <a:p>
             <a:fld id="{F6465CF2-20FA-4A27-B5DD-24B9293428AE}" type="datetimeFigureOut">
               <a:rPr lang="en-US" smtClean="0"/>
-              <a:t>4/11/2020</a:t>
+              <a:t>4/12/2020</a:t>
             </a:fld>
             <a:endParaRPr lang="en-US"/>
           </a:p>
@@ -1140,7 +1140,7 @@
           <a:p>
             <a:fld id="{F6465CF2-20FA-4A27-B5DD-24B9293428AE}" type="datetimeFigureOut">
               <a:rPr lang="en-US" smtClean="0"/>
-              <a:t>4/11/2020</a:t>
+              <a:t>4/12/2020</a:t>
             </a:fld>
             <a:endParaRPr lang="en-US"/>
           </a:p>
@@ -1405,7 +1405,7 @@
           <a:p>
             <a:fld id="{F6465CF2-20FA-4A27-B5DD-24B9293428AE}" type="datetimeFigureOut">
               <a:rPr lang="en-US" smtClean="0"/>
-              <a:t>4/11/2020</a:t>
+              <a:t>4/12/2020</a:t>
             </a:fld>
             <a:endParaRPr lang="en-US"/>
           </a:p>
@@ -1817,7 +1817,7 @@
           <a:p>
             <a:fld id="{F6465CF2-20FA-4A27-B5DD-24B9293428AE}" type="datetimeFigureOut">
               <a:rPr lang="en-US" smtClean="0"/>
-              <a:t>4/11/2020</a:t>
+              <a:t>4/12/2020</a:t>
             </a:fld>
             <a:endParaRPr lang="en-US"/>
           </a:p>
@@ -1958,7 +1958,7 @@
           <a:p>
             <a:fld id="{F6465CF2-20FA-4A27-B5DD-24B9293428AE}" type="datetimeFigureOut">
               <a:rPr lang="en-US" smtClean="0"/>
-              <a:t>4/11/2020</a:t>
+              <a:t>4/12/2020</a:t>
             </a:fld>
             <a:endParaRPr lang="en-US"/>
           </a:p>
@@ -2071,7 +2071,7 @@
           <a:p>
             <a:fld id="{F6465CF2-20FA-4A27-B5DD-24B9293428AE}" type="datetimeFigureOut">
               <a:rPr lang="en-US" smtClean="0"/>
-              <a:t>4/11/2020</a:t>
+              <a:t>4/12/2020</a:t>
             </a:fld>
             <a:endParaRPr lang="en-US"/>
           </a:p>
@@ -2382,7 +2382,7 @@
           <a:p>
             <a:fld id="{F6465CF2-20FA-4A27-B5DD-24B9293428AE}" type="datetimeFigureOut">
               <a:rPr lang="en-US" smtClean="0"/>
-              <a:t>4/11/2020</a:t>
+              <a:t>4/12/2020</a:t>
             </a:fld>
             <a:endParaRPr lang="en-US"/>
           </a:p>
@@ -2670,7 +2670,7 @@
           <a:p>
             <a:fld id="{F6465CF2-20FA-4A27-B5DD-24B9293428AE}" type="datetimeFigureOut">
               <a:rPr lang="en-US" smtClean="0"/>
-              <a:t>4/11/2020</a:t>
+              <a:t>4/12/2020</a:t>
             </a:fld>
             <a:endParaRPr lang="en-US"/>
           </a:p>
@@ -2911,7 +2911,7 @@
           <a:p>
             <a:fld id="{F6465CF2-20FA-4A27-B5DD-24B9293428AE}" type="datetimeFigureOut">
               <a:rPr lang="en-US" smtClean="0"/>
-              <a:t>4/11/2020</a:t>
+              <a:t>4/12/2020</a:t>
             </a:fld>
             <a:endParaRPr lang="en-US"/>
           </a:p>
@@ -10582,7 +10582,7 @@
 </file>
 
 <file path=ppt/slides/slide3.xml><?xml version="1.0" encoding="utf-8"?>
-<p:sld xmlns:a="http://schemas.openxmlformats.org/drawingml/2006/main" xmlns:r="http://schemas.openxmlformats.org/officeDocument/2006/relationships" xmlns:p="http://schemas.openxmlformats.org/presentationml/2006/main">
+<p:sld xmlns:a="http://schemas.openxmlformats.org/drawingml/2006/main" xmlns:r="http://schemas.openxmlformats.org/officeDocument/2006/relationships" xmlns:p="http://schemas.openxmlformats.org/presentationml/2006/main" show="0">
   <p:cSld>
     <p:spTree>
       <p:nvGrpSpPr>
@@ -12717,8 +12717,8 @@
         </p:nvSpPr>
         <p:spPr>
           <a:xfrm>
-            <a:off x="4148805" y="111289"/>
-            <a:ext cx="3875644" cy="385164"/>
+            <a:off x="3739153" y="101716"/>
+            <a:ext cx="5838574" cy="394738"/>
           </a:xfrm>
           <a:prstGeom prst="rect">
             <a:avLst/>
@@ -12900,7 +12900,7 @@
                   <a:srgbClr val="C0C0C0"/>
                 </a:highlight>
               </a:rPr>
-              <a:t>CRSP_COMP_8-K Merging Process</a:t>
+              <a:t>CRSP_COMP_8-K Merging Process (WIP!!!)</a:t>
             </a:r>
           </a:p>
         </p:txBody>

</xml_diff>